<commit_message>
Renaming and further updates to Proofreading files
"aloud" and QAG mentions
</commit_message>
<xml_diff>
--- a/training/English (en)/Refinement and Publication Training [R&P]/Proofreading/Proofreading WT Slides.pptx
+++ b/training/English (en)/Refinement and Publication Training [R&P]/Proofreading/Proofreading WT Slides.pptx
@@ -237,7 +237,7 @@
           <a:p>
             <a:fld id="{AC6AA070-92F4-A447-BB88-F5E94FF9CF8B}" type="datetimeFigureOut">
               <a:rPr lang="en-US" smtClean="0"/>
-              <a:t>2/25/25</a:t>
+              <a:t>8/29/25</a:t>
             </a:fld>
             <a:endParaRPr lang="en-US"/>
           </a:p>
@@ -641,7 +641,7 @@
           <a:p>
             <a:fld id="{2D176C0A-5C67-429D-B78E-C0F7FE360763}" type="datetimeFigureOut">
               <a:rPr lang="en-US" smtClean="0"/>
-              <a:t>2/25/25</a:t>
+              <a:t>8/29/25</a:t>
             </a:fld>
             <a:endParaRPr lang="en-US"/>
           </a:p>
@@ -7536,42 +7536,297 @@
           </a:p>
         </p:txBody>
       </p:sp>
-      <p:pic>
-        <p:nvPicPr>
-          <p:cNvPr id="4" name="Picture 3" descr="A checklist with black text&#10;&#10;AI-generated content may be incorrect.">
+      <p:sp>
+        <p:nvSpPr>
+          <p:cNvPr id="7" name="TextBox 6">
             <a:extLst>
               <a:ext uri="{FF2B5EF4-FFF2-40B4-BE49-F238E27FC236}">
-                <a16:creationId xmlns:a16="http://schemas.microsoft.com/office/drawing/2014/main" id="{BA40BDB9-B50E-6833-BDD8-856691D34149}"/>
+                <a16:creationId xmlns:a16="http://schemas.microsoft.com/office/drawing/2014/main" id="{F09D1E70-A778-AB73-3A8D-5D5C5F2D2F1E}"/>
               </a:ext>
             </a:extLst>
           </p:cNvPr>
-          <p:cNvPicPr>
-            <a:picLocks noChangeAspect="1"/>
-          </p:cNvPicPr>
+          <p:cNvSpPr txBox="1"/>
           <p:nvPr/>
-        </p:nvPicPr>
-        <p:blipFill>
-          <a:blip r:embed="rId2">
-            <a:extLst>
-              <a:ext uri="{28A0092B-C50C-407E-A947-70E740481C1C}">
-                <a14:useLocalDpi xmlns:a14="http://schemas.microsoft.com/office/drawing/2010/main" val="0"/>
-              </a:ext>
-            </a:extLst>
-          </a:blip>
-          <a:stretch>
-            <a:fillRect/>
-          </a:stretch>
-        </p:blipFill>
+        </p:nvSpPr>
         <p:spPr>
           <a:xfrm>
-            <a:off x="5818388" y="2956956"/>
-            <a:ext cx="2978574" cy="3182587"/>
+            <a:off x="6436423" y="3114846"/>
+            <a:ext cx="2434442" cy="3077766"/>
           </a:xfrm>
           <a:prstGeom prst="rect">
             <a:avLst/>
           </a:prstGeom>
+          <a:noFill/>
         </p:spPr>
-      </p:pic>
+        <p:txBody>
+          <a:bodyPr wrap="square" rtlCol="0">
+            <a:spAutoFit/>
+          </a:bodyPr>
+          <a:lstStyle/>
+          <a:p>
+            <a:pPr marL="0" marR="0">
+              <a:spcBef>
+                <a:spcPts val="0"/>
+              </a:spcBef>
+              <a:spcAft>
+                <a:spcPts val="0"/>
+              </a:spcAft>
+            </a:pPr>
+            <a:r>
+              <a:rPr lang="en-US" sz="1600" kern="100" dirty="0">
+                <a:effectLst/>
+                <a:latin typeface="Aptos" panose="020B0004020202020204" pitchFamily="34" charset="0"/>
+                <a:ea typeface="Aptos" panose="020B0004020202020204" pitchFamily="34" charset="0"/>
+                <a:cs typeface="Times New Roman" panose="02020603050405020304" pitchFamily="18" charset="0"/>
+              </a:rPr>
+              <a:t>Chapter 5 	         26 verses</a:t>
+            </a:r>
+          </a:p>
+          <a:p>
+            <a:pPr marL="342900" marR="0" lvl="0" indent="-342900">
+              <a:spcBef>
+                <a:spcPts val="0"/>
+              </a:spcBef>
+              <a:spcAft>
+                <a:spcPts val="0"/>
+              </a:spcAft>
+              <a:buFont typeface="Wingdings" pitchFamily="2" charset="2"/>
+              <a:buChar char="o"/>
+            </a:pPr>
+            <a:r>
+              <a:rPr lang="en-US" sz="1600" kern="100" dirty="0">
+                <a:latin typeface="Aptos" panose="020B0004020202020204" pitchFamily="34" charset="0"/>
+                <a:ea typeface="Aptos" panose="020B0004020202020204" pitchFamily="34" charset="0"/>
+                <a:cs typeface="Times New Roman" panose="02020603050405020304" pitchFamily="18" charset="0"/>
+              </a:rPr>
+              <a:t>chapter</a:t>
+            </a:r>
+            <a:r>
+              <a:rPr lang="en-US" sz="1600" kern="100" dirty="0">
+                <a:effectLst/>
+                <a:latin typeface="Aptos" panose="020B0004020202020204" pitchFamily="34" charset="0"/>
+                <a:ea typeface="Aptos" panose="020B0004020202020204" pitchFamily="34" charset="0"/>
+                <a:cs typeface="Times New Roman" panose="02020603050405020304" pitchFamily="18" charset="0"/>
+              </a:rPr>
+              <a:t> number</a:t>
+            </a:r>
+          </a:p>
+          <a:p>
+            <a:pPr marL="342900" marR="0" lvl="0" indent="-342900">
+              <a:spcBef>
+                <a:spcPts val="0"/>
+              </a:spcBef>
+              <a:spcAft>
+                <a:spcPts val="0"/>
+              </a:spcAft>
+              <a:buFont typeface="Wingdings" pitchFamily="2" charset="2"/>
+              <a:buChar char="o"/>
+            </a:pPr>
+            <a:r>
+              <a:rPr lang="en-US" sz="1600" kern="100" dirty="0">
+                <a:latin typeface="Aptos" panose="020B0004020202020204" pitchFamily="34" charset="0"/>
+                <a:ea typeface="Aptos" panose="020B0004020202020204" pitchFamily="34" charset="0"/>
+                <a:cs typeface="Times New Roman" panose="02020603050405020304" pitchFamily="18" charset="0"/>
+              </a:rPr>
+              <a:t>verse</a:t>
+            </a:r>
+            <a:r>
+              <a:rPr lang="en-US" sz="1600" kern="100" dirty="0">
+                <a:effectLst/>
+                <a:latin typeface="Aptos" panose="020B0004020202020204" pitchFamily="34" charset="0"/>
+                <a:ea typeface="Aptos" panose="020B0004020202020204" pitchFamily="34" charset="0"/>
+                <a:cs typeface="Times New Roman" panose="02020603050405020304" pitchFamily="18" charset="0"/>
+              </a:rPr>
+              <a:t> number</a:t>
+            </a:r>
+          </a:p>
+          <a:p>
+            <a:pPr marL="342900" marR="0" lvl="0" indent="-342900">
+              <a:spcBef>
+                <a:spcPts val="0"/>
+              </a:spcBef>
+              <a:spcAft>
+                <a:spcPts val="0"/>
+              </a:spcAft>
+              <a:buFont typeface="Wingdings" pitchFamily="2" charset="2"/>
+              <a:buChar char="o"/>
+            </a:pPr>
+            <a:r>
+              <a:rPr lang="en-US" sz="1600" kern="100" dirty="0">
+                <a:effectLst/>
+                <a:latin typeface="Aptos" panose="020B0004020202020204" pitchFamily="34" charset="0"/>
+                <a:ea typeface="Aptos" panose="020B0004020202020204" pitchFamily="34" charset="0"/>
+                <a:cs typeface="Times New Roman" panose="02020603050405020304" pitchFamily="18" charset="0"/>
+              </a:rPr>
+              <a:t>spacing</a:t>
+            </a:r>
+          </a:p>
+          <a:p>
+            <a:pPr marL="342900" marR="0" lvl="0" indent="-342900">
+              <a:spcBef>
+                <a:spcPts val="0"/>
+              </a:spcBef>
+              <a:spcAft>
+                <a:spcPts val="0"/>
+              </a:spcAft>
+              <a:buFont typeface="Wingdings" pitchFamily="2" charset="2"/>
+              <a:buChar char="o"/>
+            </a:pPr>
+            <a:r>
+              <a:rPr lang="en-US" sz="1600" kern="100" dirty="0">
+                <a:effectLst/>
+                <a:latin typeface="Aptos" panose="020B0004020202020204" pitchFamily="34" charset="0"/>
+                <a:ea typeface="Aptos" panose="020B0004020202020204" pitchFamily="34" charset="0"/>
+                <a:cs typeface="Times New Roman" panose="02020603050405020304" pitchFamily="18" charset="0"/>
+              </a:rPr>
+              <a:t>read through a</a:t>
+            </a:r>
+            <a:r>
+              <a:rPr lang="en-US" sz="1600" kern="100" dirty="0">
+                <a:latin typeface="Aptos" panose="020B0004020202020204" pitchFamily="34" charset="0"/>
+                <a:ea typeface="Aptos" panose="020B0004020202020204" pitchFamily="34" charset="0"/>
+                <a:cs typeface="Times New Roman" panose="02020603050405020304" pitchFamily="18" charset="0"/>
+              </a:rPr>
+              <a:t>loud</a:t>
+            </a:r>
+            <a:endParaRPr lang="en-US" sz="1600" kern="100" dirty="0">
+              <a:effectLst/>
+              <a:latin typeface="Aptos" panose="020B0004020202020204" pitchFamily="34" charset="0"/>
+              <a:ea typeface="Aptos" panose="020B0004020202020204" pitchFamily="34" charset="0"/>
+              <a:cs typeface="Times New Roman" panose="02020603050405020304" pitchFamily="18" charset="0"/>
+            </a:endParaRPr>
+          </a:p>
+          <a:p>
+            <a:pPr marL="342900" marR="0" lvl="0" indent="-342900">
+              <a:spcBef>
+                <a:spcPts val="0"/>
+              </a:spcBef>
+              <a:spcAft>
+                <a:spcPts val="0"/>
+              </a:spcAft>
+              <a:buFont typeface="Wingdings" pitchFamily="2" charset="2"/>
+              <a:buChar char="o"/>
+            </a:pPr>
+            <a:r>
+              <a:rPr lang="en-US" sz="1600" kern="100" dirty="0">
+                <a:effectLst/>
+                <a:latin typeface="Aptos" panose="020B0004020202020204" pitchFamily="34" charset="0"/>
+                <a:ea typeface="Aptos" panose="020B0004020202020204" pitchFamily="34" charset="0"/>
+                <a:cs typeface="Times New Roman" panose="02020603050405020304" pitchFamily="18" charset="0"/>
+              </a:rPr>
+              <a:t>ends of sentences</a:t>
+            </a:r>
+          </a:p>
+          <a:p>
+            <a:pPr marL="342900" marR="0" lvl="0" indent="-342900">
+              <a:spcBef>
+                <a:spcPts val="0"/>
+              </a:spcBef>
+              <a:spcAft>
+                <a:spcPts val="0"/>
+              </a:spcAft>
+              <a:buFont typeface="Wingdings" pitchFamily="2" charset="2"/>
+              <a:buChar char="o"/>
+            </a:pPr>
+            <a:r>
+              <a:rPr lang="en-US" sz="1600" kern="100" dirty="0">
+                <a:effectLst/>
+                <a:latin typeface="Aptos" panose="020B0004020202020204" pitchFamily="34" charset="0"/>
+                <a:ea typeface="Aptos" panose="020B0004020202020204" pitchFamily="34" charset="0"/>
+                <a:cs typeface="Times New Roman" panose="02020603050405020304" pitchFamily="18" charset="0"/>
+              </a:rPr>
+              <a:t>starts of sentences</a:t>
+            </a:r>
+          </a:p>
+          <a:p>
+            <a:pPr marL="342900" marR="0" lvl="0" indent="-342900">
+              <a:spcBef>
+                <a:spcPts val="0"/>
+              </a:spcBef>
+              <a:spcAft>
+                <a:spcPts val="0"/>
+              </a:spcAft>
+              <a:buFont typeface="Wingdings" pitchFamily="2" charset="2"/>
+              <a:buChar char="o"/>
+            </a:pPr>
+            <a:r>
+              <a:rPr lang="en-US" sz="1600" kern="100" dirty="0">
+                <a:effectLst/>
+                <a:latin typeface="Aptos" panose="020B0004020202020204" pitchFamily="34" charset="0"/>
+                <a:ea typeface="Aptos" panose="020B0004020202020204" pitchFamily="34" charset="0"/>
+                <a:cs typeface="Times New Roman" panose="02020603050405020304" pitchFamily="18" charset="0"/>
+              </a:rPr>
+              <a:t>pairs:  ( )   “  ”    [  ]</a:t>
+            </a:r>
+          </a:p>
+          <a:p>
+            <a:pPr marL="342900" marR="0" lvl="0" indent="-342900">
+              <a:spcBef>
+                <a:spcPts val="0"/>
+              </a:spcBef>
+              <a:spcAft>
+                <a:spcPts val="0"/>
+              </a:spcAft>
+              <a:buFont typeface="Wingdings" pitchFamily="2" charset="2"/>
+              <a:buChar char="o"/>
+            </a:pPr>
+            <a:r>
+              <a:rPr lang="en-US" sz="1600" kern="100" dirty="0">
+                <a:effectLst/>
+                <a:latin typeface="Aptos" panose="020B0004020202020204" pitchFamily="34" charset="0"/>
+                <a:ea typeface="Aptos" panose="020B0004020202020204" pitchFamily="34" charset="0"/>
+                <a:cs typeface="Times New Roman" panose="02020603050405020304" pitchFamily="18" charset="0"/>
+              </a:rPr>
+              <a:t>capitals on names</a:t>
+            </a:r>
+          </a:p>
+          <a:p>
+            <a:pPr marL="342900" marR="0" lvl="0" indent="-342900">
+              <a:spcBef>
+                <a:spcPts val="0"/>
+              </a:spcBef>
+              <a:spcAft>
+                <a:spcPts val="0"/>
+              </a:spcAft>
+              <a:buFont typeface="Wingdings" pitchFamily="2" charset="2"/>
+              <a:buChar char="o"/>
+            </a:pPr>
+            <a:r>
+              <a:rPr lang="en-US" sz="1600" kern="100" dirty="0">
+                <a:effectLst/>
+                <a:latin typeface="Aptos" panose="020B0004020202020204" pitchFamily="34" charset="0"/>
+                <a:ea typeface="Aptos" panose="020B0004020202020204" pitchFamily="34" charset="0"/>
+                <a:cs typeface="Times New Roman" panose="02020603050405020304" pitchFamily="18" charset="0"/>
+              </a:rPr>
+              <a:t>____________________</a:t>
+            </a:r>
+          </a:p>
+          <a:p>
+            <a:pPr marL="342900" marR="0" lvl="0" indent="-342900">
+              <a:spcBef>
+                <a:spcPts val="0"/>
+              </a:spcBef>
+              <a:spcAft>
+                <a:spcPts val="0"/>
+              </a:spcAft>
+              <a:buFont typeface="Wingdings" pitchFamily="2" charset="2"/>
+              <a:buChar char="o"/>
+            </a:pPr>
+            <a:r>
+              <a:rPr lang="en-US" sz="1600" kern="100" dirty="0">
+                <a:effectLst/>
+                <a:latin typeface="Aptos" panose="020B0004020202020204" pitchFamily="34" charset="0"/>
+                <a:ea typeface="Aptos" panose="020B0004020202020204" pitchFamily="34" charset="0"/>
+                <a:cs typeface="Times New Roman" panose="02020603050405020304" pitchFamily="18" charset="0"/>
+              </a:rPr>
+              <a:t>____________________</a:t>
+            </a:r>
+          </a:p>
+          <a:p>
+            <a:endParaRPr lang="en-US" dirty="0"/>
+          </a:p>
+        </p:txBody>
+      </p:sp>
     </p:spTree>
     <p:extLst>
       <p:ext uri="{BB962C8B-B14F-4D97-AF65-F5344CB8AC3E}">
@@ -16054,21 +16309,6 @@
 </file>
 
 <file path=customXml/item1.xml><?xml version="1.0" encoding="utf-8"?>
-<p:properties xmlns:p="http://schemas.microsoft.com/office/2006/metadata/properties" xmlns:xsi="http://www.w3.org/2001/XMLSchema-instance" xmlns:pc="http://schemas.microsoft.com/office/infopath/2007/PartnerControls">
-  <documentManagement/>
-</p:properties>
-</file>
-
-<file path=customXml/item2.xml><?xml version="1.0" encoding="utf-8"?>
-<?mso-contentType ?>
-<FormTemplates xmlns="http://schemas.microsoft.com/sharepoint/v3/contenttype/forms">
-  <Display>DocumentLibraryForm</Display>
-  <Edit>DocumentLibraryForm</Edit>
-  <New>DocumentLibraryForm</New>
-</FormTemplates>
-</file>
-
-<file path=customXml/item3.xml><?xml version="1.0" encoding="utf-8"?>
 <ct:contentTypeSchema xmlns:ct="http://schemas.microsoft.com/office/2006/metadata/contentType" xmlns:ma="http://schemas.microsoft.com/office/2006/metadata/properties/metaAttributes" ct:_="" ma:_="" ma:contentTypeName="Document" ma:contentTypeID="0x0101002F017C5ECD5AE84588140775F5D9B6FC" ma:contentTypeVersion="10" ma:contentTypeDescription="Create a new document." ma:contentTypeScope="" ma:versionID="3fff9ed69b78a1d1c48e3f96068d2b17">
   <xsd:schema xmlns:xsd="http://www.w3.org/2001/XMLSchema" xmlns:xs="http://www.w3.org/2001/XMLSchema" xmlns:p="http://schemas.microsoft.com/office/2006/metadata/properties" xmlns:ns2="fee82e44-1fa4-4144-8309-00fed2bf4198" xmlns:ns3="1a61c928-f5f6-4989-bd5d-cb8872a1b06d" targetNamespace="http://schemas.microsoft.com/office/2006/metadata/properties" ma:root="true" ma:fieldsID="7b2c40b849e0c1cff02f16dd8f1be10b" ns2:_="" ns3:_="">
     <xsd:import namespace="fee82e44-1fa4-4144-8309-00fed2bf4198"/>
@@ -16269,13 +16509,23 @@
 </ct:contentTypeSchema>
 </file>
 
+<file path=customXml/item2.xml><?xml version="1.0" encoding="utf-8"?>
+<?mso-contentType ?>
+<FormTemplates xmlns="http://schemas.microsoft.com/sharepoint/v3/contenttype/forms">
+  <Display>DocumentLibraryForm</Display>
+  <Edit>DocumentLibraryForm</Edit>
+  <New>DocumentLibraryForm</New>
+</FormTemplates>
+</file>
+
+<file path=customXml/item3.xml><?xml version="1.0" encoding="utf-8"?>
+<p:properties xmlns:p="http://schemas.microsoft.com/office/2006/metadata/properties" xmlns:xsi="http://www.w3.org/2001/XMLSchema-instance" xmlns:pc="http://schemas.microsoft.com/office/infopath/2007/PartnerControls">
+  <documentManagement/>
+</p:properties>
+</file>
+
 <file path=customXml/itemProps1.xml><?xml version="1.0" encoding="utf-8"?>
-<ds:datastoreItem xmlns:ds="http://schemas.openxmlformats.org/officeDocument/2006/customXml" ds:itemID="{DD870300-B03F-45F7-9154-521D8C74684E}">
-  <ds:schemaRefs>
-    <ds:schemaRef ds:uri="http://schemas.microsoft.com/office/2006/metadata/properties"/>
-    <ds:schemaRef ds:uri="http://schemas.microsoft.com/office/infopath/2007/PartnerControls"/>
-  </ds:schemaRefs>
-</ds:datastoreItem>
+<ds:datastoreItem xmlns:ds="http://schemas.openxmlformats.org/officeDocument/2006/customXml" ds:itemID="{5A56C661-01BB-4CE4-9C28-AEEA45892495}"/>
 </file>
 
 <file path=customXml/itemProps2.xml><?xml version="1.0" encoding="utf-8"?>
@@ -16287,20 +16537,10 @@
 </file>
 
 <file path=customXml/itemProps3.xml><?xml version="1.0" encoding="utf-8"?>
-<ds:datastoreItem xmlns:ds="http://schemas.openxmlformats.org/officeDocument/2006/customXml" ds:itemID="{5FA282B5-1259-4ECE-A686-F4DCA9ECACB5}">
+<ds:datastoreItem xmlns:ds="http://schemas.openxmlformats.org/officeDocument/2006/customXml" ds:itemID="{DD870300-B03F-45F7-9154-521D8C74684E}">
   <ds:schemaRefs>
-    <ds:schemaRef ds:uri="http://schemas.microsoft.com/office/2006/metadata/contentType"/>
-    <ds:schemaRef ds:uri="http://schemas.microsoft.com/office/2006/metadata/properties/metaAttributes"/>
-    <ds:schemaRef ds:uri="http://www.w3.org/2001/XMLSchema"/>
     <ds:schemaRef ds:uri="http://schemas.microsoft.com/office/2006/metadata/properties"/>
-    <ds:schemaRef ds:uri="fee82e44-1fa4-4144-8309-00fed2bf4198"/>
-    <ds:schemaRef ds:uri="1a61c928-f5f6-4989-bd5d-cb8872a1b06d"/>
-    <ds:schemaRef ds:uri="http://schemas.microsoft.com/office/2006/documentManagement/types"/>
     <ds:schemaRef ds:uri="http://schemas.microsoft.com/office/infopath/2007/PartnerControls"/>
-    <ds:schemaRef ds:uri="http://schemas.openxmlformats.org/package/2006/metadata/core-properties"/>
-    <ds:schemaRef ds:uri="http://purl.org/dc/elements/1.1/"/>
-    <ds:schemaRef ds:uri="http://purl.org/dc/terms/"/>
-    <ds:schemaRef ds:uri="http://schemas.microsoft.com/internal/obd"/>
   </ds:schemaRefs>
 </ds:datastoreItem>
 </file>
</xml_diff>

<commit_message>
Revised WT and slides after Zambia field test
Revised WT and slides after Zambia field test
</commit_message>
<xml_diff>
--- a/training/English (en)/Refinement and Publication Training [R&P]/Proofreading/Proofreading WT Slides.pptx
+++ b/training/English (en)/Refinement and Publication Training [R&P]/Proofreading/Proofreading WT Slides.pptx
@@ -5,7 +5,7 @@
     <p:sldMasterId id="2147483660" r:id="rId4"/>
   </p:sldMasterIdLst>
   <p:notesMasterIdLst>
-    <p:notesMasterId r:id="rId23"/>
+    <p:notesMasterId r:id="rId24"/>
   </p:notesMasterIdLst>
   <p:sldIdLst>
     <p:sldId id="282" r:id="rId5"/>
@@ -23,9 +23,10 @@
     <p:sldId id="301" r:id="rId17"/>
     <p:sldId id="302" r:id="rId18"/>
     <p:sldId id="309" r:id="rId19"/>
-    <p:sldId id="310" r:id="rId20"/>
-    <p:sldId id="294" r:id="rId21"/>
-    <p:sldId id="280" r:id="rId22"/>
+    <p:sldId id="311" r:id="rId20"/>
+    <p:sldId id="310" r:id="rId21"/>
+    <p:sldId id="294" r:id="rId22"/>
+    <p:sldId id="280" r:id="rId23"/>
   </p:sldIdLst>
   <p:sldSz cx="9144000" cy="6858000" type="screen4x3"/>
   <p:notesSz cx="6858000" cy="9144000"/>
@@ -237,7 +238,7 @@
           <a:p>
             <a:fld id="{AC6AA070-92F4-A447-BB88-F5E94FF9CF8B}" type="datetimeFigureOut">
               <a:rPr lang="en-US" smtClean="0"/>
-              <a:t>8/29/25</a:t>
+              <a:t>9/15/25</a:t>
             </a:fld>
             <a:endParaRPr lang="en-US"/>
           </a:p>
@@ -641,7 +642,7 @@
           <a:p>
             <a:fld id="{2D176C0A-5C67-429D-B78E-C0F7FE360763}" type="datetimeFigureOut">
               <a:rPr lang="en-US" smtClean="0"/>
-              <a:t>8/29/25</a:t>
+              <a:t>9/15/25</a:t>
             </a:fld>
             <a:endParaRPr lang="en-US"/>
           </a:p>
@@ -6866,7 +6867,7 @@
                 </a:solidFill>
                 <a:latin typeface="+mj-lt"/>
               </a:rPr>
-              <a:t>2</a:t>
+              <a:t>1 JOHN 2</a:t>
             </a:r>
             <a:endParaRPr lang="en-US" sz="1200" dirty="0">
               <a:solidFill>
@@ -7271,6 +7272,521 @@
   <p:cSld>
     <p:spTree>
       <p:nvGrpSpPr>
+        <p:cNvPr id="1" name="">
+          <a:extLst>
+            <a:ext uri="{FF2B5EF4-FFF2-40B4-BE49-F238E27FC236}">
+              <a16:creationId xmlns:a16="http://schemas.microsoft.com/office/drawing/2014/main" id="{CA2EC928-F6BA-6008-35F9-055D1B5DD2AA}"/>
+            </a:ext>
+          </a:extLst>
+        </p:cNvPr>
+        <p:cNvGrpSpPr/>
+        <p:nvPr/>
+      </p:nvGrpSpPr>
+      <p:grpSpPr>
+        <a:xfrm>
+          <a:off x="0" y="0"/>
+          <a:ext cx="0" cy="0"/>
+          <a:chOff x="0" y="0"/>
+          <a:chExt cx="0" cy="0"/>
+        </a:xfrm>
+      </p:grpSpPr>
+      <p:grpSp>
+        <p:nvGrpSpPr>
+          <p:cNvPr id="30" name="Group 29">
+            <a:extLst>
+              <a:ext uri="{FF2B5EF4-FFF2-40B4-BE49-F238E27FC236}">
+                <a16:creationId xmlns:a16="http://schemas.microsoft.com/office/drawing/2014/main" id="{039A0126-EBB9-E544-6C2F-90CB304BE0C0}"/>
+              </a:ext>
+            </a:extLst>
+          </p:cNvPr>
+          <p:cNvGrpSpPr/>
+          <p:nvPr/>
+        </p:nvGrpSpPr>
+        <p:grpSpPr>
+          <a:xfrm>
+            <a:off x="-127730" y="6628431"/>
+            <a:ext cx="9399460" cy="230430"/>
+            <a:chOff x="-172745" y="0"/>
+            <a:chExt cx="9399460" cy="230430"/>
+          </a:xfrm>
+        </p:grpSpPr>
+        <p:sp>
+          <p:nvSpPr>
+            <p:cNvPr id="31" name="Parallelogram 30">
+              <a:extLst>
+                <a:ext uri="{FF2B5EF4-FFF2-40B4-BE49-F238E27FC236}">
+                  <a16:creationId xmlns:a16="http://schemas.microsoft.com/office/drawing/2014/main" id="{1B048944-CC51-80B7-2D0D-AF5E0CC00A0F}"/>
+                </a:ext>
+              </a:extLst>
+            </p:cNvPr>
+            <p:cNvSpPr/>
+            <p:nvPr/>
+          </p:nvSpPr>
+          <p:spPr>
+            <a:xfrm flipH="1">
+              <a:off x="6026315" y="0"/>
+              <a:ext cx="3200400" cy="230430"/>
+            </a:xfrm>
+            <a:prstGeom prst="parallelogram">
+              <a:avLst>
+                <a:gd name="adj" fmla="val 43583"/>
+              </a:avLst>
+            </a:prstGeom>
+            <a:solidFill>
+              <a:srgbClr val="FBA93D"/>
+            </a:solidFill>
+            <a:ln>
+              <a:noFill/>
+            </a:ln>
+          </p:spPr>
+          <p:style>
+            <a:lnRef idx="2">
+              <a:schemeClr val="accent1">
+                <a:shade val="50000"/>
+              </a:schemeClr>
+            </a:lnRef>
+            <a:fillRef idx="1">
+              <a:schemeClr val="accent1"/>
+            </a:fillRef>
+            <a:effectRef idx="0">
+              <a:schemeClr val="accent1"/>
+            </a:effectRef>
+            <a:fontRef idx="minor">
+              <a:schemeClr val="lt1"/>
+            </a:fontRef>
+          </p:style>
+          <p:txBody>
+            <a:bodyPr rtlCol="0" anchor="ctr"/>
+            <a:lstStyle/>
+            <a:p>
+              <a:pPr algn="ctr"/>
+              <a:endParaRPr lang="en-US"/>
+            </a:p>
+          </p:txBody>
+        </p:sp>
+        <p:sp>
+          <p:nvSpPr>
+            <p:cNvPr id="32" name="Parallelogram 31">
+              <a:extLst>
+                <a:ext uri="{FF2B5EF4-FFF2-40B4-BE49-F238E27FC236}">
+                  <a16:creationId xmlns:a16="http://schemas.microsoft.com/office/drawing/2014/main" id="{A232F54D-DD33-9F6C-5F3F-36CB16AA12E7}"/>
+                </a:ext>
+              </a:extLst>
+            </p:cNvPr>
+            <p:cNvSpPr/>
+            <p:nvPr/>
+          </p:nvSpPr>
+          <p:spPr>
+            <a:xfrm flipH="1">
+              <a:off x="-172745" y="0"/>
+              <a:ext cx="3200400" cy="230430"/>
+            </a:xfrm>
+            <a:prstGeom prst="parallelogram">
+              <a:avLst>
+                <a:gd name="adj" fmla="val 43583"/>
+              </a:avLst>
+            </a:prstGeom>
+            <a:solidFill>
+              <a:srgbClr val="B95659"/>
+            </a:solidFill>
+            <a:ln>
+              <a:noFill/>
+            </a:ln>
+          </p:spPr>
+          <p:style>
+            <a:lnRef idx="2">
+              <a:schemeClr val="accent1">
+                <a:shade val="50000"/>
+              </a:schemeClr>
+            </a:lnRef>
+            <a:fillRef idx="1">
+              <a:schemeClr val="accent1"/>
+            </a:fillRef>
+            <a:effectRef idx="0">
+              <a:schemeClr val="accent1"/>
+            </a:effectRef>
+            <a:fontRef idx="minor">
+              <a:schemeClr val="lt1"/>
+            </a:fontRef>
+          </p:style>
+          <p:txBody>
+            <a:bodyPr rtlCol="0" anchor="ctr"/>
+            <a:lstStyle/>
+            <a:p>
+              <a:pPr algn="ctr"/>
+              <a:endParaRPr lang="en-US"/>
+            </a:p>
+          </p:txBody>
+        </p:sp>
+        <p:sp>
+          <p:nvSpPr>
+            <p:cNvPr id="33" name="Parallelogram 32">
+              <a:extLst>
+                <a:ext uri="{FF2B5EF4-FFF2-40B4-BE49-F238E27FC236}">
+                  <a16:creationId xmlns:a16="http://schemas.microsoft.com/office/drawing/2014/main" id="{0148D161-47CD-3C42-FF17-E3981575D593}"/>
+                </a:ext>
+              </a:extLst>
+            </p:cNvPr>
+            <p:cNvSpPr/>
+            <p:nvPr/>
+          </p:nvSpPr>
+          <p:spPr>
+            <a:xfrm flipH="1">
+              <a:off x="2926785" y="0"/>
+              <a:ext cx="3200400" cy="230430"/>
+            </a:xfrm>
+            <a:prstGeom prst="parallelogram">
+              <a:avLst>
+                <a:gd name="adj" fmla="val 43583"/>
+              </a:avLst>
+            </a:prstGeom>
+            <a:solidFill>
+              <a:srgbClr val="83A83F"/>
+            </a:solidFill>
+            <a:ln>
+              <a:noFill/>
+            </a:ln>
+          </p:spPr>
+          <p:style>
+            <a:lnRef idx="2">
+              <a:schemeClr val="accent1">
+                <a:shade val="50000"/>
+              </a:schemeClr>
+            </a:lnRef>
+            <a:fillRef idx="1">
+              <a:schemeClr val="accent1"/>
+            </a:fillRef>
+            <a:effectRef idx="0">
+              <a:schemeClr val="accent1"/>
+            </a:effectRef>
+            <a:fontRef idx="minor">
+              <a:schemeClr val="lt1"/>
+            </a:fontRef>
+          </p:style>
+          <p:txBody>
+            <a:bodyPr rtlCol="0" anchor="ctr"/>
+            <a:lstStyle/>
+            <a:p>
+              <a:pPr algn="ctr"/>
+              <a:endParaRPr lang="en-US"/>
+            </a:p>
+          </p:txBody>
+        </p:sp>
+      </p:grpSp>
+      <p:grpSp>
+        <p:nvGrpSpPr>
+          <p:cNvPr id="14" name="Group 13">
+            <a:extLst>
+              <a:ext uri="{FF2B5EF4-FFF2-40B4-BE49-F238E27FC236}">
+                <a16:creationId xmlns:a16="http://schemas.microsoft.com/office/drawing/2014/main" id="{2B469B04-9CA5-9911-5ED5-3A95CA7D04B4}"/>
+              </a:ext>
+            </a:extLst>
+          </p:cNvPr>
+          <p:cNvGrpSpPr/>
+          <p:nvPr/>
+        </p:nvGrpSpPr>
+        <p:grpSpPr>
+          <a:xfrm>
+            <a:off x="-127730" y="0"/>
+            <a:ext cx="9399460" cy="230430"/>
+            <a:chOff x="-172745" y="0"/>
+            <a:chExt cx="9399460" cy="230430"/>
+          </a:xfrm>
+        </p:grpSpPr>
+        <p:sp>
+          <p:nvSpPr>
+            <p:cNvPr id="15" name="Parallelogram 14">
+              <a:extLst>
+                <a:ext uri="{FF2B5EF4-FFF2-40B4-BE49-F238E27FC236}">
+                  <a16:creationId xmlns:a16="http://schemas.microsoft.com/office/drawing/2014/main" id="{325A8FA0-1FB0-2480-2CCA-92A1A07CCD90}"/>
+                </a:ext>
+              </a:extLst>
+            </p:cNvPr>
+            <p:cNvSpPr/>
+            <p:nvPr/>
+          </p:nvSpPr>
+          <p:spPr>
+            <a:xfrm flipH="1">
+              <a:off x="6026315" y="0"/>
+              <a:ext cx="3200400" cy="230430"/>
+            </a:xfrm>
+            <a:prstGeom prst="parallelogram">
+              <a:avLst>
+                <a:gd name="adj" fmla="val 43583"/>
+              </a:avLst>
+            </a:prstGeom>
+            <a:solidFill>
+              <a:srgbClr val="FBA93D"/>
+            </a:solidFill>
+            <a:ln>
+              <a:noFill/>
+            </a:ln>
+          </p:spPr>
+          <p:style>
+            <a:lnRef idx="2">
+              <a:schemeClr val="accent1">
+                <a:shade val="50000"/>
+              </a:schemeClr>
+            </a:lnRef>
+            <a:fillRef idx="1">
+              <a:schemeClr val="accent1"/>
+            </a:fillRef>
+            <a:effectRef idx="0">
+              <a:schemeClr val="accent1"/>
+            </a:effectRef>
+            <a:fontRef idx="minor">
+              <a:schemeClr val="lt1"/>
+            </a:fontRef>
+          </p:style>
+          <p:txBody>
+            <a:bodyPr rtlCol="0" anchor="ctr"/>
+            <a:lstStyle/>
+            <a:p>
+              <a:pPr algn="ctr"/>
+              <a:endParaRPr lang="en-US"/>
+            </a:p>
+          </p:txBody>
+        </p:sp>
+        <p:sp>
+          <p:nvSpPr>
+            <p:cNvPr id="16" name="Parallelogram 15">
+              <a:extLst>
+                <a:ext uri="{FF2B5EF4-FFF2-40B4-BE49-F238E27FC236}">
+                  <a16:creationId xmlns:a16="http://schemas.microsoft.com/office/drawing/2014/main" id="{672918AB-FE7B-CB05-A164-37CB43AAEE8F}"/>
+                </a:ext>
+              </a:extLst>
+            </p:cNvPr>
+            <p:cNvSpPr/>
+            <p:nvPr/>
+          </p:nvSpPr>
+          <p:spPr>
+            <a:xfrm flipH="1">
+              <a:off x="-172745" y="0"/>
+              <a:ext cx="3200400" cy="230430"/>
+            </a:xfrm>
+            <a:prstGeom prst="parallelogram">
+              <a:avLst>
+                <a:gd name="adj" fmla="val 43583"/>
+              </a:avLst>
+            </a:prstGeom>
+            <a:solidFill>
+              <a:srgbClr val="B95659"/>
+            </a:solidFill>
+            <a:ln>
+              <a:noFill/>
+            </a:ln>
+          </p:spPr>
+          <p:style>
+            <a:lnRef idx="2">
+              <a:schemeClr val="accent1">
+                <a:shade val="50000"/>
+              </a:schemeClr>
+            </a:lnRef>
+            <a:fillRef idx="1">
+              <a:schemeClr val="accent1"/>
+            </a:fillRef>
+            <a:effectRef idx="0">
+              <a:schemeClr val="accent1"/>
+            </a:effectRef>
+            <a:fontRef idx="minor">
+              <a:schemeClr val="lt1"/>
+            </a:fontRef>
+          </p:style>
+          <p:txBody>
+            <a:bodyPr rtlCol="0" anchor="ctr"/>
+            <a:lstStyle/>
+            <a:p>
+              <a:pPr algn="ctr"/>
+              <a:endParaRPr lang="en-US"/>
+            </a:p>
+          </p:txBody>
+        </p:sp>
+        <p:sp>
+          <p:nvSpPr>
+            <p:cNvPr id="17" name="Parallelogram 16">
+              <a:extLst>
+                <a:ext uri="{FF2B5EF4-FFF2-40B4-BE49-F238E27FC236}">
+                  <a16:creationId xmlns:a16="http://schemas.microsoft.com/office/drawing/2014/main" id="{7FE1D4CF-675D-73CF-9CDD-7F4B778D0474}"/>
+                </a:ext>
+              </a:extLst>
+            </p:cNvPr>
+            <p:cNvSpPr/>
+            <p:nvPr/>
+          </p:nvSpPr>
+          <p:spPr>
+            <a:xfrm flipH="1">
+              <a:off x="2926785" y="0"/>
+              <a:ext cx="3200400" cy="230430"/>
+            </a:xfrm>
+            <a:prstGeom prst="parallelogram">
+              <a:avLst>
+                <a:gd name="adj" fmla="val 43583"/>
+              </a:avLst>
+            </a:prstGeom>
+            <a:solidFill>
+              <a:srgbClr val="83A83F"/>
+            </a:solidFill>
+            <a:ln>
+              <a:noFill/>
+            </a:ln>
+          </p:spPr>
+          <p:style>
+            <a:lnRef idx="2">
+              <a:schemeClr val="accent1">
+                <a:shade val="50000"/>
+              </a:schemeClr>
+            </a:lnRef>
+            <a:fillRef idx="1">
+              <a:schemeClr val="accent1"/>
+            </a:fillRef>
+            <a:effectRef idx="0">
+              <a:schemeClr val="accent1"/>
+            </a:effectRef>
+            <a:fontRef idx="minor">
+              <a:schemeClr val="lt1"/>
+            </a:fontRef>
+          </p:style>
+          <p:txBody>
+            <a:bodyPr rtlCol="0" anchor="ctr"/>
+            <a:lstStyle/>
+            <a:p>
+              <a:pPr algn="ctr"/>
+              <a:endParaRPr lang="en-US"/>
+            </a:p>
+          </p:txBody>
+        </p:sp>
+      </p:grpSp>
+      <p:pic>
+        <p:nvPicPr>
+          <p:cNvPr id="4" name="Picture 3" descr="A hand writing on a chalkboard&#10;&#10;Description automatically generated">
+            <a:extLst>
+              <a:ext uri="{FF2B5EF4-FFF2-40B4-BE49-F238E27FC236}">
+                <a16:creationId xmlns:a16="http://schemas.microsoft.com/office/drawing/2014/main" id="{BC8B4CD3-1798-9C5A-8D61-4550DB812772}"/>
+              </a:ext>
+            </a:extLst>
+          </p:cNvPr>
+          <p:cNvPicPr>
+            <a:picLocks noChangeAspect="1"/>
+          </p:cNvPicPr>
+          <p:nvPr/>
+        </p:nvPicPr>
+        <p:blipFill>
+          <a:blip r:embed="rId2">
+            <a:extLst>
+              <a:ext uri="{28A0092B-C50C-407E-A947-70E740481C1C}">
+                <a14:useLocalDpi xmlns:a14="http://schemas.microsoft.com/office/drawing/2010/main" val="0"/>
+              </a:ext>
+            </a:extLst>
+          </a:blip>
+          <a:stretch>
+            <a:fillRect/>
+          </a:stretch>
+        </p:blipFill>
+        <p:spPr>
+          <a:xfrm>
+            <a:off x="2768121" y="1961377"/>
+            <a:ext cx="6006975" cy="2936107"/>
+          </a:xfrm>
+          <a:prstGeom prst="rect">
+            <a:avLst/>
+          </a:prstGeom>
+        </p:spPr>
+      </p:pic>
+      <p:sp>
+        <p:nvSpPr>
+          <p:cNvPr id="2" name="TextBox 1">
+            <a:extLst>
+              <a:ext uri="{FF2B5EF4-FFF2-40B4-BE49-F238E27FC236}">
+                <a16:creationId xmlns:a16="http://schemas.microsoft.com/office/drawing/2014/main" id="{39FAC3FD-CC3B-1D69-6A9B-E1EB057B73DD}"/>
+              </a:ext>
+            </a:extLst>
+          </p:cNvPr>
+          <p:cNvSpPr txBox="1"/>
+          <p:nvPr/>
+        </p:nvSpPr>
+        <p:spPr>
+          <a:xfrm>
+            <a:off x="0" y="2967335"/>
+            <a:ext cx="2591302" cy="1200329"/>
+          </a:xfrm>
+          <a:prstGeom prst="rect">
+            <a:avLst/>
+          </a:prstGeom>
+          <a:noFill/>
+        </p:spPr>
+        <p:txBody>
+          <a:bodyPr wrap="square" rtlCol="0">
+            <a:spAutoFit/>
+          </a:bodyPr>
+          <a:lstStyle/>
+          <a:p>
+            <a:pPr algn="ctr"/>
+            <a:r>
+              <a:rPr lang="en-US" b="1" dirty="0">
+                <a:highlight>
+                  <a:srgbClr val="FFFF00"/>
+                </a:highlight>
+                <a:latin typeface="Arial" panose="020B0604020202020204" pitchFamily="34" charset="0"/>
+                <a:ea typeface="Calibri" panose="020F0502020204030204" pitchFamily="34" charset="0"/>
+                <a:cs typeface="Times New Roman" panose="02020603050405020304" pitchFamily="18" charset="0"/>
+              </a:rPr>
+              <a:t>Correct </a:t>
+            </a:r>
+            <a:br>
+              <a:rPr lang="en-US" b="1" dirty="0">
+                <a:highlight>
+                  <a:srgbClr val="FFFF00"/>
+                </a:highlight>
+                <a:latin typeface="Arial" panose="020B0604020202020204" pitchFamily="34" charset="0"/>
+                <a:ea typeface="Calibri" panose="020F0502020204030204" pitchFamily="34" charset="0"/>
+                <a:cs typeface="Times New Roman" panose="02020603050405020304" pitchFamily="18" charset="0"/>
+              </a:rPr>
+            </a:br>
+            <a:r>
+              <a:rPr lang="en-US" b="1" dirty="0">
+                <a:highlight>
+                  <a:srgbClr val="FFFF00"/>
+                </a:highlight>
+                <a:latin typeface="Arial" panose="020B0604020202020204" pitchFamily="34" charset="0"/>
+                <a:ea typeface="Calibri" panose="020F0502020204030204" pitchFamily="34" charset="0"/>
+                <a:cs typeface="Times New Roman" panose="02020603050405020304" pitchFamily="18" charset="0"/>
+              </a:rPr>
+              <a:t>Spelling Errors in Common Words</a:t>
+            </a:r>
+            <a:endParaRPr lang="en-US" sz="1800" b="1" dirty="0">
+              <a:effectLst/>
+              <a:highlight>
+                <a:srgbClr val="FFFF00"/>
+              </a:highlight>
+              <a:latin typeface="Arial" panose="020B0604020202020204" pitchFamily="34" charset="0"/>
+              <a:ea typeface="Calibri" panose="020F0502020204030204" pitchFamily="34" charset="0"/>
+              <a:cs typeface="Times New Roman" panose="02020603050405020304" pitchFamily="18" charset="0"/>
+            </a:endParaRPr>
+          </a:p>
+          <a:p>
+            <a:pPr algn="ctr"/>
+            <a:endParaRPr lang="en-US" dirty="0"/>
+          </a:p>
+        </p:txBody>
+      </p:sp>
+    </p:spTree>
+    <p:extLst>
+      <p:ext uri="{BB962C8B-B14F-4D97-AF65-F5344CB8AC3E}">
+        <p14:creationId xmlns:p14="http://schemas.microsoft.com/office/powerpoint/2010/main" val="2779940291"/>
+      </p:ext>
+    </p:extLst>
+  </p:cSld>
+  <p:clrMapOvr>
+    <a:masterClrMapping/>
+  </p:clrMapOvr>
+</p:sld>
+</file>
+
+<file path=ppt/slides/slide17.xml><?xml version="1.0" encoding="utf-8"?>
+<p:sld xmlns:a="http://schemas.openxmlformats.org/drawingml/2006/main" xmlns:r="http://schemas.openxmlformats.org/officeDocument/2006/relationships" xmlns:p="http://schemas.openxmlformats.org/presentationml/2006/main">
+  <p:cSld>
+    <p:spTree>
+      <p:nvGrpSpPr>
         <p:cNvPr id="1" name=""/>
         <p:cNvGrpSpPr/>
         <p:nvPr/>
@@ -7297,8 +7813,8 @@
         </p:nvSpPr>
         <p:spPr>
           <a:xfrm>
-            <a:off x="368136" y="3429000"/>
-            <a:ext cx="6400800" cy="2246769"/>
+            <a:off x="982821" y="2911867"/>
+            <a:ext cx="5090435" cy="3046988"/>
           </a:xfrm>
           <a:prstGeom prst="rect">
             <a:avLst/>
@@ -7316,7 +7832,7 @@
               <a:buChar char="•"/>
             </a:pPr>
             <a:r>
-              <a:rPr lang="en-US" sz="2800" b="1" dirty="0"/>
+              <a:rPr lang="en-US" sz="2400" b="1" dirty="0"/>
               <a:t>One chapter at a time</a:t>
             </a:r>
           </a:p>
@@ -7326,7 +7842,7 @@
               <a:buChar char="•"/>
             </a:pPr>
             <a:r>
-              <a:rPr lang="en-US" sz="2800" b="1" dirty="0"/>
+              <a:rPr lang="en-US" sz="2400" b="1" dirty="0"/>
               <a:t>One category at a time</a:t>
             </a:r>
           </a:p>
@@ -7336,8 +7852,8 @@
               <a:buChar char="•"/>
             </a:pPr>
             <a:r>
-              <a:rPr lang="en-US" sz="2800" b="1" dirty="0"/>
-              <a:t>Mark the corrections</a:t>
+              <a:rPr lang="en-US" sz="2400" b="1" dirty="0"/>
+              <a:t>Read out loud!</a:t>
             </a:r>
           </a:p>
           <a:p>
@@ -7346,14 +7862,41 @@
               <a:buChar char="•"/>
             </a:pPr>
             <a:r>
-              <a:rPr lang="en-US" sz="2800" b="1" dirty="0"/>
+              <a:rPr lang="en-US" sz="2400" b="1" dirty="0"/>
+              <a:t>Mark the corrections</a:t>
+            </a:r>
+          </a:p>
+          <a:p>
+            <a:pPr marL="457200" indent="-457200">
+              <a:buFont typeface="Arial" panose="020B0604020202020204" pitchFamily="34" charset="0"/>
+              <a:buChar char="•"/>
+            </a:pPr>
+            <a:r>
+              <a:rPr lang="en-US" sz="2400" b="1" dirty="0"/>
+              <a:t>Correct spelling errors in </a:t>
+            </a:r>
+            <a:br>
+              <a:rPr lang="en-US" sz="2400" b="1" dirty="0"/>
+            </a:br>
+            <a:r>
+              <a:rPr lang="en-US" sz="2400" b="1" dirty="0"/>
+              <a:t>common words</a:t>
+            </a:r>
+          </a:p>
+          <a:p>
+            <a:pPr marL="457200" indent="-457200">
+              <a:buFont typeface="Arial" panose="020B0604020202020204" pitchFamily="34" charset="0"/>
+              <a:buChar char="•"/>
+            </a:pPr>
+            <a:r>
+              <a:rPr lang="en-US" sz="2400" b="1" dirty="0"/>
               <a:t>Mark the Checklist box when </a:t>
             </a:r>
             <a:br>
-              <a:rPr lang="en-US" sz="2800" b="1" dirty="0"/>
+              <a:rPr lang="en-US" sz="2400" b="1" dirty="0"/>
             </a:br>
             <a:r>
-              <a:rPr lang="en-US" sz="2800" b="1" dirty="0"/>
+              <a:rPr lang="en-US" sz="2400" b="1" dirty="0"/>
               <a:t>each category is completed</a:t>
             </a:r>
           </a:p>
@@ -7583,13 +8126,7 @@
             </a:r>
           </a:p>
           <a:p>
-            <a:pPr marL="342900" marR="0" lvl="0" indent="-342900">
-              <a:spcBef>
-                <a:spcPts val="0"/>
-              </a:spcBef>
-              <a:spcAft>
-                <a:spcPts val="0"/>
-              </a:spcAft>
+            <a:pPr marL="342900" indent="-342900">
               <a:buFont typeface="Wingdings" pitchFamily="2" charset="2"/>
               <a:buChar char="o"/>
             </a:pPr>
@@ -7599,16 +8136,7 @@
                 <a:ea typeface="Aptos" panose="020B0004020202020204" pitchFamily="34" charset="0"/>
                 <a:cs typeface="Times New Roman" panose="02020603050405020304" pitchFamily="18" charset="0"/>
               </a:rPr>
-              <a:t>chapter</a:t>
-            </a:r>
-            <a:r>
-              <a:rPr lang="en-US" sz="1600" kern="100" dirty="0">
-                <a:effectLst/>
-                <a:latin typeface="Aptos" panose="020B0004020202020204" pitchFamily="34" charset="0"/>
-                <a:ea typeface="Aptos" panose="020B0004020202020204" pitchFamily="34" charset="0"/>
-                <a:cs typeface="Times New Roman" panose="02020603050405020304" pitchFamily="18" charset="0"/>
-              </a:rPr>
-              <a:t> number</a:t>
+              <a:t>verse numbers</a:t>
             </a:r>
           </a:p>
           <a:p>
@@ -7628,7 +8156,7 @@
                 <a:ea typeface="Aptos" panose="020B0004020202020204" pitchFamily="34" charset="0"/>
                 <a:cs typeface="Times New Roman" panose="02020603050405020304" pitchFamily="18" charset="0"/>
               </a:rPr>
-              <a:t>verse</a:t>
+              <a:t>chapter</a:t>
             </a:r>
             <a:r>
               <a:rPr lang="en-US" sz="1600" kern="100" dirty="0">
@@ -7673,7 +8201,7 @@
               <a:buChar char="o"/>
             </a:pPr>
             <a:r>
-              <a:rPr lang="en-US" sz="1600" kern="100" dirty="0">
+              <a:rPr lang="en-US" sz="1600" b="1" kern="100" dirty="0">
                 <a:effectLst/>
                 <a:latin typeface="Aptos" panose="020B0004020202020204" pitchFamily="34" charset="0"/>
                 <a:ea typeface="Aptos" panose="020B0004020202020204" pitchFamily="34" charset="0"/>
@@ -7682,14 +8210,14 @@
               <a:t>read through a</a:t>
             </a:r>
             <a:r>
-              <a:rPr lang="en-US" sz="1600" kern="100" dirty="0">
+              <a:rPr lang="en-US" sz="1600" b="1" kern="100" dirty="0">
                 <a:latin typeface="Aptos" panose="020B0004020202020204" pitchFamily="34" charset="0"/>
                 <a:ea typeface="Aptos" panose="020B0004020202020204" pitchFamily="34" charset="0"/>
                 <a:cs typeface="Times New Roman" panose="02020603050405020304" pitchFamily="18" charset="0"/>
               </a:rPr>
               <a:t>loud</a:t>
             </a:r>
-            <a:endParaRPr lang="en-US" sz="1600" kern="100" dirty="0">
+            <a:endParaRPr lang="en-US" sz="1600" b="1" kern="100" dirty="0">
               <a:effectLst/>
               <a:latin typeface="Aptos" panose="020B0004020202020204" pitchFamily="34" charset="0"/>
               <a:ea typeface="Aptos" panose="020B0004020202020204" pitchFamily="34" charset="0"/>
@@ -8257,6 +8785,212 @@
                       </p:childTnLst>
                     </p:cTn>
                   </p:par>
+                  <p:par>
+                    <p:cTn id="27" fill="hold">
+                      <p:stCondLst>
+                        <p:cond delay="indefinite"/>
+                      </p:stCondLst>
+                      <p:childTnLst>
+                        <p:par>
+                          <p:cTn id="28" fill="hold">
+                            <p:stCondLst>
+                              <p:cond delay="0"/>
+                            </p:stCondLst>
+                            <p:childTnLst>
+                              <p:par>
+                                <p:cTn id="29" presetID="2" presetClass="entr" presetSubtype="4" fill="hold" nodeType="clickEffect">
+                                  <p:stCondLst>
+                                    <p:cond delay="0"/>
+                                  </p:stCondLst>
+                                  <p:childTnLst>
+                                    <p:set>
+                                      <p:cBhvr>
+                                        <p:cTn id="30" dur="1" fill="hold">
+                                          <p:stCondLst>
+                                            <p:cond delay="0"/>
+                                          </p:stCondLst>
+                                        </p:cTn>
+                                        <p:tgtEl>
+                                          <p:spTgt spid="2">
+                                            <p:txEl>
+                                              <p:pRg st="4" end="4"/>
+                                            </p:txEl>
+                                          </p:spTgt>
+                                        </p:tgtEl>
+                                        <p:attrNameLst>
+                                          <p:attrName>style.visibility</p:attrName>
+                                        </p:attrNameLst>
+                                      </p:cBhvr>
+                                      <p:to>
+                                        <p:strVal val="visible"/>
+                                      </p:to>
+                                    </p:set>
+                                    <p:anim calcmode="lin" valueType="num">
+                                      <p:cBhvr additive="base">
+                                        <p:cTn id="31" dur="500" fill="hold"/>
+                                        <p:tgtEl>
+                                          <p:spTgt spid="2">
+                                            <p:txEl>
+                                              <p:pRg st="4" end="4"/>
+                                            </p:txEl>
+                                          </p:spTgt>
+                                        </p:tgtEl>
+                                        <p:attrNameLst>
+                                          <p:attrName>ppt_x</p:attrName>
+                                        </p:attrNameLst>
+                                      </p:cBhvr>
+                                      <p:tavLst>
+                                        <p:tav tm="0">
+                                          <p:val>
+                                            <p:strVal val="#ppt_x"/>
+                                          </p:val>
+                                        </p:tav>
+                                        <p:tav tm="100000">
+                                          <p:val>
+                                            <p:strVal val="#ppt_x"/>
+                                          </p:val>
+                                        </p:tav>
+                                      </p:tavLst>
+                                    </p:anim>
+                                    <p:anim calcmode="lin" valueType="num">
+                                      <p:cBhvr additive="base">
+                                        <p:cTn id="32" dur="500" fill="hold"/>
+                                        <p:tgtEl>
+                                          <p:spTgt spid="2">
+                                            <p:txEl>
+                                              <p:pRg st="4" end="4"/>
+                                            </p:txEl>
+                                          </p:spTgt>
+                                        </p:tgtEl>
+                                        <p:attrNameLst>
+                                          <p:attrName>ppt_y</p:attrName>
+                                        </p:attrNameLst>
+                                      </p:cBhvr>
+                                      <p:tavLst>
+                                        <p:tav tm="0">
+                                          <p:val>
+                                            <p:strVal val="1+#ppt_h/2"/>
+                                          </p:val>
+                                        </p:tav>
+                                        <p:tav tm="100000">
+                                          <p:val>
+                                            <p:strVal val="#ppt_y"/>
+                                          </p:val>
+                                        </p:tav>
+                                      </p:tavLst>
+                                    </p:anim>
+                                  </p:childTnLst>
+                                </p:cTn>
+                              </p:par>
+                            </p:childTnLst>
+                          </p:cTn>
+                        </p:par>
+                      </p:childTnLst>
+                    </p:cTn>
+                  </p:par>
+                  <p:par>
+                    <p:cTn id="33" fill="hold">
+                      <p:stCondLst>
+                        <p:cond delay="indefinite"/>
+                      </p:stCondLst>
+                      <p:childTnLst>
+                        <p:par>
+                          <p:cTn id="34" fill="hold">
+                            <p:stCondLst>
+                              <p:cond delay="0"/>
+                            </p:stCondLst>
+                            <p:childTnLst>
+                              <p:par>
+                                <p:cTn id="35" presetID="2" presetClass="entr" presetSubtype="4" fill="hold" nodeType="clickEffect">
+                                  <p:stCondLst>
+                                    <p:cond delay="0"/>
+                                  </p:stCondLst>
+                                  <p:childTnLst>
+                                    <p:set>
+                                      <p:cBhvr>
+                                        <p:cTn id="36" dur="1" fill="hold">
+                                          <p:stCondLst>
+                                            <p:cond delay="0"/>
+                                          </p:stCondLst>
+                                        </p:cTn>
+                                        <p:tgtEl>
+                                          <p:spTgt spid="2">
+                                            <p:txEl>
+                                              <p:pRg st="5" end="5"/>
+                                            </p:txEl>
+                                          </p:spTgt>
+                                        </p:tgtEl>
+                                        <p:attrNameLst>
+                                          <p:attrName>style.visibility</p:attrName>
+                                        </p:attrNameLst>
+                                      </p:cBhvr>
+                                      <p:to>
+                                        <p:strVal val="visible"/>
+                                      </p:to>
+                                    </p:set>
+                                    <p:anim calcmode="lin" valueType="num">
+                                      <p:cBhvr additive="base">
+                                        <p:cTn id="37" dur="500" fill="hold"/>
+                                        <p:tgtEl>
+                                          <p:spTgt spid="2">
+                                            <p:txEl>
+                                              <p:pRg st="5" end="5"/>
+                                            </p:txEl>
+                                          </p:spTgt>
+                                        </p:tgtEl>
+                                        <p:attrNameLst>
+                                          <p:attrName>ppt_x</p:attrName>
+                                        </p:attrNameLst>
+                                      </p:cBhvr>
+                                      <p:tavLst>
+                                        <p:tav tm="0">
+                                          <p:val>
+                                            <p:strVal val="#ppt_x"/>
+                                          </p:val>
+                                        </p:tav>
+                                        <p:tav tm="100000">
+                                          <p:val>
+                                            <p:strVal val="#ppt_x"/>
+                                          </p:val>
+                                        </p:tav>
+                                      </p:tavLst>
+                                    </p:anim>
+                                    <p:anim calcmode="lin" valueType="num">
+                                      <p:cBhvr additive="base">
+                                        <p:cTn id="38" dur="500" fill="hold"/>
+                                        <p:tgtEl>
+                                          <p:spTgt spid="2">
+                                            <p:txEl>
+                                              <p:pRg st="5" end="5"/>
+                                            </p:txEl>
+                                          </p:spTgt>
+                                        </p:tgtEl>
+                                        <p:attrNameLst>
+                                          <p:attrName>ppt_y</p:attrName>
+                                        </p:attrNameLst>
+                                      </p:cBhvr>
+                                      <p:tavLst>
+                                        <p:tav tm="0">
+                                          <p:val>
+                                            <p:strVal val="1+#ppt_h/2"/>
+                                          </p:val>
+                                        </p:tav>
+                                        <p:tav tm="100000">
+                                          <p:val>
+                                            <p:strVal val="#ppt_y"/>
+                                          </p:val>
+                                        </p:tav>
+                                      </p:tavLst>
+                                    </p:anim>
+                                  </p:childTnLst>
+                                </p:cTn>
+                              </p:par>
+                            </p:childTnLst>
+                          </p:cTn>
+                        </p:par>
+                      </p:childTnLst>
+                    </p:cTn>
+                  </p:par>
                 </p:childTnLst>
               </p:cTn>
               <p:prevCondLst>
@@ -8282,7 +9016,7 @@
 </p:sld>
 </file>
 
-<file path=ppt/slides/slide17.xml><?xml version="1.0" encoding="utf-8"?>
+<file path=ppt/slides/slide18.xml><?xml version="1.0" encoding="utf-8"?>
 <p:sld xmlns:a="http://schemas.openxmlformats.org/drawingml/2006/main" xmlns:r="http://schemas.openxmlformats.org/officeDocument/2006/relationships" xmlns:p="http://schemas.openxmlformats.org/presentationml/2006/main">
   <p:cSld>
     <p:spTree>
@@ -8677,7 +9411,7 @@
 </p:sld>
 </file>
 
-<file path=ppt/slides/slide18.xml><?xml version="1.0" encoding="utf-8"?>
+<file path=ppt/slides/slide19.xml><?xml version="1.0" encoding="utf-8"?>
 <p:sld xmlns:a="http://schemas.openxmlformats.org/drawingml/2006/main" xmlns:r="http://schemas.openxmlformats.org/officeDocument/2006/relationships" xmlns:p="http://schemas.openxmlformats.org/presentationml/2006/main">
   <p:cSld>
     <p:spTree>
@@ -16309,10 +17043,10 @@
 </file>
 
 <file path=customXml/item1.xml><?xml version="1.0" encoding="utf-8"?>
-<ct:contentTypeSchema xmlns:ct="http://schemas.microsoft.com/office/2006/metadata/contentType" xmlns:ma="http://schemas.microsoft.com/office/2006/metadata/properties/metaAttributes" ct:_="" ma:_="" ma:contentTypeName="Document" ma:contentTypeID="0x0101002F017C5ECD5AE84588140775F5D9B6FC" ma:contentTypeVersion="10" ma:contentTypeDescription="Create a new document." ma:contentTypeScope="" ma:versionID="3fff9ed69b78a1d1c48e3f96068d2b17">
-  <xsd:schema xmlns:xsd="http://www.w3.org/2001/XMLSchema" xmlns:xs="http://www.w3.org/2001/XMLSchema" xmlns:p="http://schemas.microsoft.com/office/2006/metadata/properties" xmlns:ns2="fee82e44-1fa4-4144-8309-00fed2bf4198" xmlns:ns3="1a61c928-f5f6-4989-bd5d-cb8872a1b06d" targetNamespace="http://schemas.microsoft.com/office/2006/metadata/properties" ma:root="true" ma:fieldsID="7b2c40b849e0c1cff02f16dd8f1be10b" ns2:_="" ns3:_="">
-    <xsd:import namespace="fee82e44-1fa4-4144-8309-00fed2bf4198"/>
-    <xsd:import namespace="1a61c928-f5f6-4989-bd5d-cb8872a1b06d"/>
+<ct:contentTypeSchema xmlns:ct="http://schemas.microsoft.com/office/2006/metadata/contentType" xmlns:ma="http://schemas.microsoft.com/office/2006/metadata/properties/metaAttributes" ct:_="" ma:_="" ma:contentTypeName="Document" ma:contentTypeID="0x01010071D61B65BC2620489977AC19E3D0F0D7" ma:contentTypeVersion="13" ma:contentTypeDescription="Create a new document." ma:contentTypeScope="" ma:versionID="8a831be9947c06829626ef4c3ae04f7e">
+  <xsd:schema xmlns:xsd="http://www.w3.org/2001/XMLSchema" xmlns:xs="http://www.w3.org/2001/XMLSchema" xmlns:p="http://schemas.microsoft.com/office/2006/metadata/properties" xmlns:ns2="dd208db9-1446-42c5-a2ba-6edb048d778c" xmlns:ns3="df9e8f7b-edc3-48d8-b0f6-325d38f0409f" targetNamespace="http://schemas.microsoft.com/office/2006/metadata/properties" ma:root="true" ma:fieldsID="78c4f0b40700243a6cd3bae50c44ab61" ns2:_="" ns3:_="">
+    <xsd:import namespace="dd208db9-1446-42c5-a2ba-6edb048d778c"/>
+    <xsd:import namespace="df9e8f7b-edc3-48d8-b0f6-325d38f0409f"/>
     <xsd:element name="properties">
       <xsd:complexType>
         <xsd:sequence>
@@ -16321,14 +17055,17 @@
               <xsd:all>
                 <xsd:element ref="ns2:MediaServiceMetadata" minOccurs="0"/>
                 <xsd:element ref="ns2:MediaServiceFastMetadata" minOccurs="0"/>
+                <xsd:element ref="ns2:MediaServiceAutoKeyPoints" minOccurs="0"/>
+                <xsd:element ref="ns2:MediaServiceKeyPoints" minOccurs="0"/>
                 <xsd:element ref="ns3:SharedWithUsers" minOccurs="0"/>
                 <xsd:element ref="ns3:SharedWithDetails" minOccurs="0"/>
                 <xsd:element ref="ns2:MediaServiceDateTaken" minOccurs="0"/>
                 <xsd:element ref="ns2:MediaLengthInSeconds" minOccurs="0"/>
-                <xsd:element ref="ns2:MediaServiceObjectDetectorVersions" minOccurs="0"/>
+                <xsd:element ref="ns2:MediaServiceAutoTags" minOccurs="0"/>
                 <xsd:element ref="ns2:MediaServiceGenerationTime" minOccurs="0"/>
                 <xsd:element ref="ns2:MediaServiceEventHashCode" minOccurs="0"/>
-                <xsd:element ref="ns2:MediaServiceSearchProperties" minOccurs="0"/>
+                <xsd:element ref="ns2:MediaServiceLocation" minOccurs="0"/>
+                <xsd:element ref="ns2:MediaServiceOCR" minOccurs="0"/>
               </xsd:all>
             </xsd:complexType>
           </xsd:element>
@@ -16336,7 +17073,7 @@
       </xsd:complexType>
     </xsd:element>
   </xsd:schema>
-  <xsd:schema xmlns:xsd="http://www.w3.org/2001/XMLSchema" xmlns:xs="http://www.w3.org/2001/XMLSchema" xmlns:dms="http://schemas.microsoft.com/office/2006/documentManagement/types" xmlns:pc="http://schemas.microsoft.com/office/infopath/2007/PartnerControls" targetNamespace="fee82e44-1fa4-4144-8309-00fed2bf4198" elementFormDefault="qualified">
+  <xsd:schema xmlns:xsd="http://www.w3.org/2001/XMLSchema" xmlns:xs="http://www.w3.org/2001/XMLSchema" xmlns:dms="http://schemas.microsoft.com/office/2006/documentManagement/types" xmlns:pc="http://schemas.microsoft.com/office/infopath/2007/PartnerControls" targetNamespace="dd208db9-1446-42c5-a2ba-6edb048d778c" elementFormDefault="qualified">
     <xsd:import namespace="http://schemas.microsoft.com/office/2006/documentManagement/types"/>
     <xsd:import namespace="http://schemas.microsoft.com/office/infopath/2007/PartnerControls"/>
     <xsd:element name="MediaServiceMetadata" ma:index="8" nillable="true" ma:displayName="MediaServiceMetadata" ma:hidden="true" ma:internalName="MediaServiceMetadata" ma:readOnly="true">
@@ -16349,41 +17086,60 @@
         <xsd:restriction base="dms:Note"/>
       </xsd:simpleType>
     </xsd:element>
-    <xsd:element name="MediaServiceDateTaken" ma:index="12" nillable="true" ma:displayName="MediaServiceDateTaken" ma:hidden="true" ma:indexed="true" ma:internalName="MediaServiceDateTaken" ma:readOnly="true">
+    <xsd:element name="MediaServiceAutoKeyPoints" ma:index="10" nillable="true" ma:displayName="MediaServiceAutoKeyPoints" ma:hidden="true" ma:internalName="MediaServiceAutoKeyPoints" ma:readOnly="true">
+      <xsd:simpleType>
+        <xsd:restriction base="dms:Note"/>
+      </xsd:simpleType>
+    </xsd:element>
+    <xsd:element name="MediaServiceKeyPoints" ma:index="11" nillable="true" ma:displayName="KeyPoints" ma:internalName="MediaServiceKeyPoints" ma:readOnly="true">
+      <xsd:simpleType>
+        <xsd:restriction base="dms:Note">
+          <xsd:maxLength value="255"/>
+        </xsd:restriction>
+      </xsd:simpleType>
+    </xsd:element>
+    <xsd:element name="MediaServiceDateTaken" ma:index="14" nillable="true" ma:displayName="MediaServiceDateTaken" ma:hidden="true" ma:internalName="MediaServiceDateTaken" ma:readOnly="true">
       <xsd:simpleType>
         <xsd:restriction base="dms:Text"/>
       </xsd:simpleType>
     </xsd:element>
-    <xsd:element name="MediaLengthInSeconds" ma:index="13" nillable="true" ma:displayName="MediaLengthInSeconds" ma:hidden="true" ma:internalName="MediaLengthInSeconds" ma:readOnly="true">
+    <xsd:element name="MediaLengthInSeconds" ma:index="15" nillable="true" ma:displayName="Length (seconds)" ma:internalName="MediaLengthInSeconds" ma:readOnly="true">
       <xsd:simpleType>
         <xsd:restriction base="dms:Unknown"/>
       </xsd:simpleType>
     </xsd:element>
-    <xsd:element name="MediaServiceObjectDetectorVersions" ma:index="14" nillable="true" ma:displayName="MediaServiceObjectDetectorVersions" ma:hidden="true" ma:indexed="true" ma:internalName="MediaServiceObjectDetectorVersions" ma:readOnly="true">
+    <xsd:element name="MediaServiceAutoTags" ma:index="16" nillable="true" ma:displayName="Tags" ma:internalName="MediaServiceAutoTags" ma:readOnly="true">
       <xsd:simpleType>
         <xsd:restriction base="dms:Text"/>
       </xsd:simpleType>
     </xsd:element>
-    <xsd:element name="MediaServiceGenerationTime" ma:index="15" nillable="true" ma:displayName="MediaServiceGenerationTime" ma:hidden="true" ma:internalName="MediaServiceGenerationTime" ma:readOnly="true">
+    <xsd:element name="MediaServiceGenerationTime" ma:index="17" nillable="true" ma:displayName="MediaServiceGenerationTime" ma:hidden="true" ma:internalName="MediaServiceGenerationTime" ma:readOnly="true">
       <xsd:simpleType>
         <xsd:restriction base="dms:Text"/>
       </xsd:simpleType>
     </xsd:element>
-    <xsd:element name="MediaServiceEventHashCode" ma:index="16" nillable="true" ma:displayName="MediaServiceEventHashCode" ma:hidden="true" ma:internalName="MediaServiceEventHashCode" ma:readOnly="true">
+    <xsd:element name="MediaServiceEventHashCode" ma:index="18" nillable="true" ma:displayName="MediaServiceEventHashCode" ma:hidden="true" ma:internalName="MediaServiceEventHashCode" ma:readOnly="true">
       <xsd:simpleType>
         <xsd:restriction base="dms:Text"/>
       </xsd:simpleType>
     </xsd:element>
-    <xsd:element name="MediaServiceSearchProperties" ma:index="17" nillable="true" ma:displayName="MediaServiceSearchProperties" ma:hidden="true" ma:internalName="MediaServiceSearchProperties" ma:readOnly="true">
+    <xsd:element name="MediaServiceLocation" ma:index="19" nillable="true" ma:displayName="Location" ma:internalName="MediaServiceLocation" ma:readOnly="true">
       <xsd:simpleType>
-        <xsd:restriction base="dms:Note"/>
+        <xsd:restriction base="dms:Text"/>
+      </xsd:simpleType>
+    </xsd:element>
+    <xsd:element name="MediaServiceOCR" ma:index="20" nillable="true" ma:displayName="Extracted Text" ma:internalName="MediaServiceOCR" ma:readOnly="true">
+      <xsd:simpleType>
+        <xsd:restriction base="dms:Note">
+          <xsd:maxLength value="255"/>
+        </xsd:restriction>
       </xsd:simpleType>
     </xsd:element>
   </xsd:schema>
-  <xsd:schema xmlns:xsd="http://www.w3.org/2001/XMLSchema" xmlns:xs="http://www.w3.org/2001/XMLSchema" xmlns:dms="http://schemas.microsoft.com/office/2006/documentManagement/types" xmlns:pc="http://schemas.microsoft.com/office/infopath/2007/PartnerControls" targetNamespace="1a61c928-f5f6-4989-bd5d-cb8872a1b06d" elementFormDefault="qualified">
+  <xsd:schema xmlns:xsd="http://www.w3.org/2001/XMLSchema" xmlns:xs="http://www.w3.org/2001/XMLSchema" xmlns:dms="http://schemas.microsoft.com/office/2006/documentManagement/types" xmlns:pc="http://schemas.microsoft.com/office/infopath/2007/PartnerControls" targetNamespace="df9e8f7b-edc3-48d8-b0f6-325d38f0409f" elementFormDefault="qualified">
     <xsd:import namespace="http://schemas.microsoft.com/office/2006/documentManagement/types"/>
     <xsd:import namespace="http://schemas.microsoft.com/office/infopath/2007/PartnerControls"/>
-    <xsd:element name="SharedWithUsers" ma:index="10" nillable="true" ma:displayName="Shared With" ma:internalName="SharedWithUsers" ma:readOnly="true">
+    <xsd:element name="SharedWithUsers" ma:index="12" nillable="true" ma:displayName="Shared With" ma:internalName="SharedWithUsers" ma:readOnly="true">
       <xsd:complexType>
         <xsd:complexContent>
           <xsd:extension base="dms:UserMulti">
@@ -16402,7 +17158,7 @@
         </xsd:complexContent>
       </xsd:complexType>
     </xsd:element>
-    <xsd:element name="SharedWithDetails" ma:index="11" nillable="true" ma:displayName="Shared With Details" ma:internalName="SharedWithDetails" ma:readOnly="true">
+    <xsd:element name="SharedWithDetails" ma:index="13" nillable="true" ma:displayName="Shared With Details" ma:internalName="SharedWithDetails" ma:readOnly="true">
       <xsd:simpleType>
         <xsd:restriction base="dms:Note">
           <xsd:maxLength value="255"/>
@@ -16510,6 +17266,12 @@
 </file>
 
 <file path=customXml/item2.xml><?xml version="1.0" encoding="utf-8"?>
+<p:properties xmlns:p="http://schemas.microsoft.com/office/2006/metadata/properties" xmlns:xsi="http://www.w3.org/2001/XMLSchema-instance" xmlns:pc="http://schemas.microsoft.com/office/infopath/2007/PartnerControls">
+  <documentManagement/>
+</p:properties>
+</file>
+
+<file path=customXml/item3.xml><?xml version="1.0" encoding="utf-8"?>
 <?mso-contentType ?>
 <FormTemplates xmlns="http://schemas.microsoft.com/sharepoint/v3/contenttype/forms">
   <Display>DocumentLibraryForm</Display>
@@ -16518,29 +17280,38 @@
 </FormTemplates>
 </file>
 
-<file path=customXml/item3.xml><?xml version="1.0" encoding="utf-8"?>
-<p:properties xmlns:p="http://schemas.microsoft.com/office/2006/metadata/properties" xmlns:xsi="http://www.w3.org/2001/XMLSchema-instance" xmlns:pc="http://schemas.microsoft.com/office/infopath/2007/PartnerControls">
-  <documentManagement/>
-</p:properties>
-</file>
-
 <file path=customXml/itemProps1.xml><?xml version="1.0" encoding="utf-8"?>
-<ds:datastoreItem xmlns:ds="http://schemas.openxmlformats.org/officeDocument/2006/customXml" ds:itemID="{5A56C661-01BB-4CE4-9C28-AEEA45892495}"/>
-</file>
-
-<file path=customXml/itemProps2.xml><?xml version="1.0" encoding="utf-8"?>
-<ds:datastoreItem xmlns:ds="http://schemas.openxmlformats.org/officeDocument/2006/customXml" ds:itemID="{B178770A-F6AC-406B-AF0D-88CBCF36B701}">
+<ds:datastoreItem xmlns:ds="http://schemas.openxmlformats.org/officeDocument/2006/customXml" ds:itemID="{8EEE4A2C-7994-4F4A-8BF0-BA8921CBB57D}">
   <ds:schemaRefs>
-    <ds:schemaRef ds:uri="http://schemas.microsoft.com/sharepoint/v3/contenttype/forms"/>
+    <ds:schemaRef ds:uri="http://schemas.microsoft.com/office/2006/metadata/contentType"/>
+    <ds:schemaRef ds:uri="http://schemas.microsoft.com/office/2006/metadata/properties/metaAttributes"/>
+    <ds:schemaRef ds:uri="http://www.w3.org/2001/XMLSchema"/>
+    <ds:schemaRef ds:uri="http://schemas.microsoft.com/office/2006/metadata/properties"/>
+    <ds:schemaRef ds:uri="dd208db9-1446-42c5-a2ba-6edb048d778c"/>
+    <ds:schemaRef ds:uri="df9e8f7b-edc3-48d8-b0f6-325d38f0409f"/>
+    <ds:schemaRef ds:uri="http://schemas.microsoft.com/office/2006/documentManagement/types"/>
+    <ds:schemaRef ds:uri="http://schemas.microsoft.com/office/infopath/2007/PartnerControls"/>
+    <ds:schemaRef ds:uri="http://schemas.openxmlformats.org/package/2006/metadata/core-properties"/>
+    <ds:schemaRef ds:uri="http://purl.org/dc/elements/1.1/"/>
+    <ds:schemaRef ds:uri="http://purl.org/dc/terms/"/>
+    <ds:schemaRef ds:uri="http://schemas.microsoft.com/internal/obd"/>
   </ds:schemaRefs>
 </ds:datastoreItem>
 </file>
 
-<file path=customXml/itemProps3.xml><?xml version="1.0" encoding="utf-8"?>
+<file path=customXml/itemProps2.xml><?xml version="1.0" encoding="utf-8"?>
 <ds:datastoreItem xmlns:ds="http://schemas.openxmlformats.org/officeDocument/2006/customXml" ds:itemID="{DD870300-B03F-45F7-9154-521D8C74684E}">
   <ds:schemaRefs>
     <ds:schemaRef ds:uri="http://schemas.microsoft.com/office/2006/metadata/properties"/>
     <ds:schemaRef ds:uri="http://schemas.microsoft.com/office/infopath/2007/PartnerControls"/>
   </ds:schemaRefs>
 </ds:datastoreItem>
+</file>
+
+<file path=customXml/itemProps3.xml><?xml version="1.0" encoding="utf-8"?>
+<ds:datastoreItem xmlns:ds="http://schemas.openxmlformats.org/officeDocument/2006/customXml" ds:itemID="{B178770A-F6AC-406B-AF0D-88CBCF36B701}">
+  <ds:schemaRefs>
+    <ds:schemaRef ds:uri="http://schemas.microsoft.com/sharepoint/v3/contenttype/forms"/>
+  </ds:schemaRefs>
+</ds:datastoreItem>
 </file>
</xml_diff>